<commit_message>
openQMS: update headers and footers Rationale: simplify design
</commit_message>
<xml_diff>
--- a/7. Documentation and Records Subsystem/DOC/DOC-701 - Powerpoint Template.pptx
+++ b/7. Documentation and Records Subsystem/DOC/DOC-701 - Powerpoint Template.pptx
@@ -198,7 +198,7 @@
           <a:p>
             <a:fld id="{5464E162-CBEC-4925-93AE-447FF31D8791}" type="datetimeFigureOut">
               <a:rPr lang="en-US" smtClean="0"/>
-              <a:t>1/8/23</a:t>
+              <a:t>1/5/24</a:t>
             </a:fld>
             <a:endParaRPr lang="en-US"/>
           </a:p>
@@ -3205,8 +3205,12 @@
           </a:lstStyle>
           <a:p>
             <a:r>
+              <a:rPr lang="en-US" dirty="0" err="1"/>
+              <a:t>openQMS</a:t>
+            </a:r>
+            <a:r>
               <a:rPr lang="en-US" dirty="0"/>
-              <a:t>☐ Confidential </a:t>
+              <a:t> </a:t>
             </a:r>
             <a:r>
               <a:rPr lang="de-DE" dirty="0"/>
@@ -3354,18 +3358,157 @@
             </a:r>
             <a:r>
               <a:rPr lang="en-US" baseline="0" dirty="0"/>
-              <a:t> 002</a:t>
+              <a:t> 003</a:t>
             </a:r>
             <a:endParaRPr lang="en-US" dirty="0"/>
+          </a:p>
+        </p:txBody>
+      </p:sp>
+      <p:sp>
+        <p:nvSpPr>
+          <p:cNvPr id="12" name="Footer Placeholder 4">
+            <a:extLst>
+              <a:ext uri="{FF2B5EF4-FFF2-40B4-BE49-F238E27FC236}">
+                <a16:creationId xmlns:a16="http://schemas.microsoft.com/office/drawing/2014/main" id="{AAD75AD3-29D2-C692-9E66-E73B73A6CC92}"/>
+              </a:ext>
+            </a:extLst>
+          </p:cNvPr>
+          <p:cNvSpPr txBox="1">
+            <a:spLocks/>
+          </p:cNvSpPr>
+          <p:nvPr userDrawn="1"/>
+        </p:nvSpPr>
+        <p:spPr>
+          <a:xfrm>
+            <a:off x="4220928" y="390524"/>
+            <a:ext cx="3741972" cy="365125"/>
+          </a:xfrm>
+          <a:prstGeom prst="rect">
+            <a:avLst/>
+          </a:prstGeom>
+        </p:spPr>
+        <p:txBody>
+          <a:bodyPr vert="horz" lIns="91440" tIns="45720" rIns="91440" bIns="45720" rtlCol="0" anchor="ctr"/>
+          <a:lstStyle>
+            <a:defPPr>
+              <a:defRPr lang="en-US"/>
+            </a:defPPr>
+            <a:lvl1pPr marL="0" algn="ctr" defTabSz="914400" rtl="0" eaLnBrk="1" latinLnBrk="0" hangingPunct="1">
+              <a:defRPr sz="1200" kern="1200">
+                <a:solidFill>
+                  <a:schemeClr val="tx1">
+                    <a:tint val="75000"/>
+                  </a:schemeClr>
+                </a:solidFill>
+                <a:latin typeface="+mn-lt"/>
+                <a:ea typeface="+mn-ea"/>
+                <a:cs typeface="+mn-cs"/>
+              </a:defRPr>
+            </a:lvl1pPr>
+            <a:lvl2pPr marL="457200" algn="l" defTabSz="914400" rtl="0" eaLnBrk="1" latinLnBrk="0" hangingPunct="1">
+              <a:defRPr sz="1800" kern="1200">
+                <a:solidFill>
+                  <a:schemeClr val="tx1"/>
+                </a:solidFill>
+                <a:latin typeface="+mn-lt"/>
+                <a:ea typeface="+mn-ea"/>
+                <a:cs typeface="+mn-cs"/>
+              </a:defRPr>
+            </a:lvl2pPr>
+            <a:lvl3pPr marL="914400" algn="l" defTabSz="914400" rtl="0" eaLnBrk="1" latinLnBrk="0" hangingPunct="1">
+              <a:defRPr sz="1800" kern="1200">
+                <a:solidFill>
+                  <a:schemeClr val="tx1"/>
+                </a:solidFill>
+                <a:latin typeface="+mn-lt"/>
+                <a:ea typeface="+mn-ea"/>
+                <a:cs typeface="+mn-cs"/>
+              </a:defRPr>
+            </a:lvl3pPr>
+            <a:lvl4pPr marL="1371600" algn="l" defTabSz="914400" rtl="0" eaLnBrk="1" latinLnBrk="0" hangingPunct="1">
+              <a:defRPr sz="1800" kern="1200">
+                <a:solidFill>
+                  <a:schemeClr val="tx1"/>
+                </a:solidFill>
+                <a:latin typeface="+mn-lt"/>
+                <a:ea typeface="+mn-ea"/>
+                <a:cs typeface="+mn-cs"/>
+              </a:defRPr>
+            </a:lvl4pPr>
+            <a:lvl5pPr marL="1828800" algn="l" defTabSz="914400" rtl="0" eaLnBrk="1" latinLnBrk="0" hangingPunct="1">
+              <a:defRPr sz="1800" kern="1200">
+                <a:solidFill>
+                  <a:schemeClr val="tx1"/>
+                </a:solidFill>
+                <a:latin typeface="+mn-lt"/>
+                <a:ea typeface="+mn-ea"/>
+                <a:cs typeface="+mn-cs"/>
+              </a:defRPr>
+            </a:lvl5pPr>
+            <a:lvl6pPr marL="2286000" algn="l" defTabSz="914400" rtl="0" eaLnBrk="1" latinLnBrk="0" hangingPunct="1">
+              <a:defRPr sz="1800" kern="1200">
+                <a:solidFill>
+                  <a:schemeClr val="tx1"/>
+                </a:solidFill>
+                <a:latin typeface="+mn-lt"/>
+                <a:ea typeface="+mn-ea"/>
+                <a:cs typeface="+mn-cs"/>
+              </a:defRPr>
+            </a:lvl6pPr>
+            <a:lvl7pPr marL="2743200" algn="l" defTabSz="914400" rtl="0" eaLnBrk="1" latinLnBrk="0" hangingPunct="1">
+              <a:defRPr sz="1800" kern="1200">
+                <a:solidFill>
+                  <a:schemeClr val="tx1"/>
+                </a:solidFill>
+                <a:latin typeface="+mn-lt"/>
+                <a:ea typeface="+mn-ea"/>
+                <a:cs typeface="+mn-cs"/>
+              </a:defRPr>
+            </a:lvl7pPr>
+            <a:lvl8pPr marL="3200400" algn="l" defTabSz="914400" rtl="0" eaLnBrk="1" latinLnBrk="0" hangingPunct="1">
+              <a:defRPr sz="1800" kern="1200">
+                <a:solidFill>
+                  <a:schemeClr val="tx1"/>
+                </a:solidFill>
+                <a:latin typeface="+mn-lt"/>
+                <a:ea typeface="+mn-ea"/>
+                <a:cs typeface="+mn-cs"/>
+              </a:defRPr>
+            </a:lvl8pPr>
+            <a:lvl9pPr marL="3657600" algn="l" defTabSz="914400" rtl="0" eaLnBrk="1" latinLnBrk="0" hangingPunct="1">
+              <a:defRPr sz="1800" kern="1200">
+                <a:solidFill>
+                  <a:schemeClr val="tx1"/>
+                </a:solidFill>
+                <a:latin typeface="+mn-lt"/>
+                <a:ea typeface="+mn-ea"/>
+                <a:cs typeface="+mn-cs"/>
+              </a:defRPr>
+            </a:lvl9pPr>
+          </a:lstStyle>
+          <a:p>
+            <a:pPr algn="ctr"/>
+            <a:r>
+              <a:rPr lang="en-US" dirty="0"/>
+              <a:t>Author: </a:t>
+            </a:r>
+            <a:r>
+              <a:rPr lang="en-US" dirty="0" err="1"/>
+              <a:t>Evolunis</a:t>
+            </a:r>
+            <a:r>
+              <a:rPr lang="en-US" dirty="0"/>
+              <a:t> GmbH</a:t>
+            </a:r>
           </a:p>
         </p:txBody>
       </p:sp>
       <p:pic>
         <p:nvPicPr>
-          <p:cNvPr id="5" name="Picture 4">
+          <p:cNvPr id="7" name="Picture 6">
             <a:extLst>
               <a:ext uri="{FF2B5EF4-FFF2-40B4-BE49-F238E27FC236}">
-                <a16:creationId xmlns:a16="http://schemas.microsoft.com/office/drawing/2014/main" id="{8F81DF9B-8387-A5EB-DE1A-B13E4187D11B}"/>
+                <a16:creationId xmlns:a16="http://schemas.microsoft.com/office/drawing/2014/main" id="{912485A9-A829-7373-51E1-938C87D28BFB}"/>
               </a:ext>
             </a:extLst>
           </p:cNvPr>
@@ -3375,160 +3518,27 @@
           <p:nvPr userDrawn="1"/>
         </p:nvPicPr>
         <p:blipFill>
-          <a:blip r:embed="rId13"/>
+          <a:blip r:embed="rId13" cstate="print">
+            <a:extLst>
+              <a:ext uri="{28A0092B-C50C-407E-A947-70E740481C1C}">
+                <a14:useLocalDpi xmlns:a14="http://schemas.microsoft.com/office/drawing/2010/main" val="0"/>
+              </a:ext>
+            </a:extLst>
+          </a:blip>
           <a:stretch>
             <a:fillRect/>
           </a:stretch>
         </p:blipFill>
         <p:spPr>
           <a:xfrm>
-            <a:off x="9731953" y="6307992"/>
-            <a:ext cx="1620000" cy="493624"/>
+            <a:off x="9736623" y="6307992"/>
+            <a:ext cx="1615330" cy="449792"/>
           </a:xfrm>
           <a:prstGeom prst="rect">
             <a:avLst/>
           </a:prstGeom>
         </p:spPr>
       </p:pic>
-      <p:sp>
-        <p:nvSpPr>
-          <p:cNvPr id="12" name="Footer Placeholder 4">
-            <a:extLst>
-              <a:ext uri="{FF2B5EF4-FFF2-40B4-BE49-F238E27FC236}">
-                <a16:creationId xmlns:a16="http://schemas.microsoft.com/office/drawing/2014/main" id="{AAD75AD3-29D2-C692-9E66-E73B73A6CC92}"/>
-              </a:ext>
-            </a:extLst>
-          </p:cNvPr>
-          <p:cNvSpPr txBox="1">
-            <a:spLocks/>
-          </p:cNvSpPr>
-          <p:nvPr userDrawn="1"/>
-        </p:nvSpPr>
-        <p:spPr>
-          <a:xfrm>
-            <a:off x="4220928" y="390524"/>
-            <a:ext cx="3741972" cy="365125"/>
-          </a:xfrm>
-          <a:prstGeom prst="rect">
-            <a:avLst/>
-          </a:prstGeom>
-        </p:spPr>
-        <p:txBody>
-          <a:bodyPr vert="horz" lIns="91440" tIns="45720" rIns="91440" bIns="45720" rtlCol="0" anchor="ctr"/>
-          <a:lstStyle>
-            <a:defPPr>
-              <a:defRPr lang="en-US"/>
-            </a:defPPr>
-            <a:lvl1pPr marL="0" algn="ctr" defTabSz="914400" rtl="0" eaLnBrk="1" latinLnBrk="0" hangingPunct="1">
-              <a:defRPr sz="1200" kern="1200">
-                <a:solidFill>
-                  <a:schemeClr val="tx1">
-                    <a:tint val="75000"/>
-                  </a:schemeClr>
-                </a:solidFill>
-                <a:latin typeface="+mn-lt"/>
-                <a:ea typeface="+mn-ea"/>
-                <a:cs typeface="+mn-cs"/>
-              </a:defRPr>
-            </a:lvl1pPr>
-            <a:lvl2pPr marL="457200" algn="l" defTabSz="914400" rtl="0" eaLnBrk="1" latinLnBrk="0" hangingPunct="1">
-              <a:defRPr sz="1800" kern="1200">
-                <a:solidFill>
-                  <a:schemeClr val="tx1"/>
-                </a:solidFill>
-                <a:latin typeface="+mn-lt"/>
-                <a:ea typeface="+mn-ea"/>
-                <a:cs typeface="+mn-cs"/>
-              </a:defRPr>
-            </a:lvl2pPr>
-            <a:lvl3pPr marL="914400" algn="l" defTabSz="914400" rtl="0" eaLnBrk="1" latinLnBrk="0" hangingPunct="1">
-              <a:defRPr sz="1800" kern="1200">
-                <a:solidFill>
-                  <a:schemeClr val="tx1"/>
-                </a:solidFill>
-                <a:latin typeface="+mn-lt"/>
-                <a:ea typeface="+mn-ea"/>
-                <a:cs typeface="+mn-cs"/>
-              </a:defRPr>
-            </a:lvl3pPr>
-            <a:lvl4pPr marL="1371600" algn="l" defTabSz="914400" rtl="0" eaLnBrk="1" latinLnBrk="0" hangingPunct="1">
-              <a:defRPr sz="1800" kern="1200">
-                <a:solidFill>
-                  <a:schemeClr val="tx1"/>
-                </a:solidFill>
-                <a:latin typeface="+mn-lt"/>
-                <a:ea typeface="+mn-ea"/>
-                <a:cs typeface="+mn-cs"/>
-              </a:defRPr>
-            </a:lvl4pPr>
-            <a:lvl5pPr marL="1828800" algn="l" defTabSz="914400" rtl="0" eaLnBrk="1" latinLnBrk="0" hangingPunct="1">
-              <a:defRPr sz="1800" kern="1200">
-                <a:solidFill>
-                  <a:schemeClr val="tx1"/>
-                </a:solidFill>
-                <a:latin typeface="+mn-lt"/>
-                <a:ea typeface="+mn-ea"/>
-                <a:cs typeface="+mn-cs"/>
-              </a:defRPr>
-            </a:lvl5pPr>
-            <a:lvl6pPr marL="2286000" algn="l" defTabSz="914400" rtl="0" eaLnBrk="1" latinLnBrk="0" hangingPunct="1">
-              <a:defRPr sz="1800" kern="1200">
-                <a:solidFill>
-                  <a:schemeClr val="tx1"/>
-                </a:solidFill>
-                <a:latin typeface="+mn-lt"/>
-                <a:ea typeface="+mn-ea"/>
-                <a:cs typeface="+mn-cs"/>
-              </a:defRPr>
-            </a:lvl6pPr>
-            <a:lvl7pPr marL="2743200" algn="l" defTabSz="914400" rtl="0" eaLnBrk="1" latinLnBrk="0" hangingPunct="1">
-              <a:defRPr sz="1800" kern="1200">
-                <a:solidFill>
-                  <a:schemeClr val="tx1"/>
-                </a:solidFill>
-                <a:latin typeface="+mn-lt"/>
-                <a:ea typeface="+mn-ea"/>
-                <a:cs typeface="+mn-cs"/>
-              </a:defRPr>
-            </a:lvl7pPr>
-            <a:lvl8pPr marL="3200400" algn="l" defTabSz="914400" rtl="0" eaLnBrk="1" latinLnBrk="0" hangingPunct="1">
-              <a:defRPr sz="1800" kern="1200">
-                <a:solidFill>
-                  <a:schemeClr val="tx1"/>
-                </a:solidFill>
-                <a:latin typeface="+mn-lt"/>
-                <a:ea typeface="+mn-ea"/>
-                <a:cs typeface="+mn-cs"/>
-              </a:defRPr>
-            </a:lvl8pPr>
-            <a:lvl9pPr marL="3657600" algn="l" defTabSz="914400" rtl="0" eaLnBrk="1" latinLnBrk="0" hangingPunct="1">
-              <a:defRPr sz="1800" kern="1200">
-                <a:solidFill>
-                  <a:schemeClr val="tx1"/>
-                </a:solidFill>
-                <a:latin typeface="+mn-lt"/>
-                <a:ea typeface="+mn-ea"/>
-                <a:cs typeface="+mn-cs"/>
-              </a:defRPr>
-            </a:lvl9pPr>
-          </a:lstStyle>
-          <a:p>
-            <a:pPr algn="ctr"/>
-            <a:r>
-              <a:rPr lang="en-US" dirty="0"/>
-              <a:t>Author: </a:t>
-            </a:r>
-            <a:r>
-              <a:rPr lang="en-US" dirty="0" err="1"/>
-              <a:t>Evolunis</a:t>
-            </a:r>
-            <a:r>
-              <a:rPr lang="en-US" dirty="0"/>
-              <a:t> GmbH</a:t>
-            </a:r>
-          </a:p>
-        </p:txBody>
-      </p:sp>
     </p:spTree>
     <p:extLst>
       <p:ext uri="{BB962C8B-B14F-4D97-AF65-F5344CB8AC3E}">

</xml_diff>